<commit_message>
2024.07.05 - 테스트 시나리오 minor fix
</commit_message>
<xml_diff>
--- a/otel-ppt/테스트 시나리오_v1.0.pptx
+++ b/otel-ppt/테스트 시나리오_v1.0.pptx
@@ -216,7 +216,7 @@
           <a:p>
             <a:fld id="{2E0810E1-330C-471B-B1C6-86BE8659BC48}" type="datetimeFigureOut">
               <a:rPr lang="ko-KR" altLang="en-US" smtClean="0"/>
-              <a:t>2024-07-04</a:t>
+              <a:t>2024-07-05</a:t>
             </a:fld>
             <a:endParaRPr lang="ko-KR" altLang="en-US"/>
           </a:p>
@@ -714,7 +714,7 @@
           <a:p>
             <a:fld id="{E86E7649-CCE4-42EE-81F9-40C1E9625764}" type="datetimeFigureOut">
               <a:rPr lang="ko-KR" altLang="en-US" smtClean="0"/>
-              <a:t>2024-07-04</a:t>
+              <a:t>2024-07-05</a:t>
             </a:fld>
             <a:endParaRPr lang="ko-KR" altLang="en-US"/>
           </a:p>
@@ -912,7 +912,7 @@
           <a:p>
             <a:fld id="{E86E7649-CCE4-42EE-81F9-40C1E9625764}" type="datetimeFigureOut">
               <a:rPr lang="ko-KR" altLang="en-US" smtClean="0"/>
-              <a:t>2024-07-04</a:t>
+              <a:t>2024-07-05</a:t>
             </a:fld>
             <a:endParaRPr lang="ko-KR" altLang="en-US"/>
           </a:p>
@@ -1120,7 +1120,7 @@
           <a:p>
             <a:fld id="{E86E7649-CCE4-42EE-81F9-40C1E9625764}" type="datetimeFigureOut">
               <a:rPr lang="ko-KR" altLang="en-US" smtClean="0"/>
-              <a:t>2024-07-04</a:t>
+              <a:t>2024-07-05</a:t>
             </a:fld>
             <a:endParaRPr lang="ko-KR" altLang="en-US"/>
           </a:p>
@@ -1318,7 +1318,7 @@
           <a:p>
             <a:fld id="{E86E7649-CCE4-42EE-81F9-40C1E9625764}" type="datetimeFigureOut">
               <a:rPr lang="ko-KR" altLang="en-US" smtClean="0"/>
-              <a:t>2024-07-04</a:t>
+              <a:t>2024-07-05</a:t>
             </a:fld>
             <a:endParaRPr lang="ko-KR" altLang="en-US"/>
           </a:p>
@@ -1593,7 +1593,7 @@
           <a:p>
             <a:fld id="{E86E7649-CCE4-42EE-81F9-40C1E9625764}" type="datetimeFigureOut">
               <a:rPr lang="ko-KR" altLang="en-US" smtClean="0"/>
-              <a:t>2024-07-04</a:t>
+              <a:t>2024-07-05</a:t>
             </a:fld>
             <a:endParaRPr lang="ko-KR" altLang="en-US"/>
           </a:p>
@@ -1858,7 +1858,7 @@
           <a:p>
             <a:fld id="{E86E7649-CCE4-42EE-81F9-40C1E9625764}" type="datetimeFigureOut">
               <a:rPr lang="ko-KR" altLang="en-US" smtClean="0"/>
-              <a:t>2024-07-04</a:t>
+              <a:t>2024-07-05</a:t>
             </a:fld>
             <a:endParaRPr lang="ko-KR" altLang="en-US"/>
           </a:p>
@@ -2270,7 +2270,7 @@
           <a:p>
             <a:fld id="{E86E7649-CCE4-42EE-81F9-40C1E9625764}" type="datetimeFigureOut">
               <a:rPr lang="ko-KR" altLang="en-US" smtClean="0"/>
-              <a:t>2024-07-04</a:t>
+              <a:t>2024-07-05</a:t>
             </a:fld>
             <a:endParaRPr lang="ko-KR" altLang="en-US"/>
           </a:p>
@@ -2411,7 +2411,7 @@
           <a:p>
             <a:fld id="{E86E7649-CCE4-42EE-81F9-40C1E9625764}" type="datetimeFigureOut">
               <a:rPr lang="ko-KR" altLang="en-US" smtClean="0"/>
-              <a:t>2024-07-04</a:t>
+              <a:t>2024-07-05</a:t>
             </a:fld>
             <a:endParaRPr lang="ko-KR" altLang="en-US"/>
           </a:p>
@@ -2524,7 +2524,7 @@
           <a:p>
             <a:fld id="{E86E7649-CCE4-42EE-81F9-40C1E9625764}" type="datetimeFigureOut">
               <a:rPr lang="ko-KR" altLang="en-US" smtClean="0"/>
-              <a:t>2024-07-04</a:t>
+              <a:t>2024-07-05</a:t>
             </a:fld>
             <a:endParaRPr lang="ko-KR" altLang="en-US"/>
           </a:p>
@@ -2835,7 +2835,7 @@
           <a:p>
             <a:fld id="{E86E7649-CCE4-42EE-81F9-40C1E9625764}" type="datetimeFigureOut">
               <a:rPr lang="ko-KR" altLang="en-US" smtClean="0"/>
-              <a:t>2024-07-04</a:t>
+              <a:t>2024-07-05</a:t>
             </a:fld>
             <a:endParaRPr lang="ko-KR" altLang="en-US"/>
           </a:p>
@@ -3123,7 +3123,7 @@
           <a:p>
             <a:fld id="{E86E7649-CCE4-42EE-81F9-40C1E9625764}" type="datetimeFigureOut">
               <a:rPr lang="ko-KR" altLang="en-US" smtClean="0"/>
-              <a:t>2024-07-04</a:t>
+              <a:t>2024-07-05</a:t>
             </a:fld>
             <a:endParaRPr lang="ko-KR" altLang="en-US"/>
           </a:p>
@@ -3364,7 +3364,7 @@
           <a:p>
             <a:fld id="{E86E7649-CCE4-42EE-81F9-40C1E9625764}" type="datetimeFigureOut">
               <a:rPr lang="ko-KR" altLang="en-US" smtClean="0"/>
-              <a:t>2024-07-04</a:t>
+              <a:t>2024-07-05</a:t>
             </a:fld>
             <a:endParaRPr lang="ko-KR" altLang="en-US"/>
           </a:p>
@@ -3796,7 +3796,7 @@
           <p:nvPr>
             <p:extLst>
               <p:ext uri="{D42A27DB-BD31-4B8C-83A1-F6EECF244321}">
-                <p14:modId xmlns:p14="http://schemas.microsoft.com/office/powerpoint/2010/main" val="514017749"/>
+                <p14:modId xmlns:p14="http://schemas.microsoft.com/office/powerpoint/2010/main" val="2200691649"/>
               </p:ext>
             </p:extLst>
           </p:nvPr>
@@ -3912,8 +3912,12 @@
                     <a:p>
                       <a:pPr algn="ctr" latinLnBrk="1"/>
                       <a:r>
+                        <a:rPr lang="en-US" altLang="ko-KR" sz="1400" dirty="0"/>
+                        <a:t>A. </a:t>
+                      </a:r>
+                      <a:r>
                         <a:rPr lang="ko-KR" altLang="en-US" sz="1400" dirty="0"/>
-                        <a:t>지연 테스트</a:t>
+                        <a:t>응답속도 지연 테스트</a:t>
                       </a:r>
                       <a:endParaRPr lang="en-US" altLang="ko-KR" sz="1400" dirty="0"/>
                     </a:p>
@@ -4001,8 +4005,12 @@
                     <a:p>
                       <a:pPr algn="ctr" latinLnBrk="1"/>
                       <a:r>
+                        <a:rPr lang="en-US" altLang="ko-KR" sz="1400" dirty="0"/>
+                        <a:t>B. </a:t>
+                      </a:r>
+                      <a:r>
                         <a:rPr lang="ko-KR" altLang="en-US" sz="1400" dirty="0"/>
-                        <a:t>부하 테스트</a:t>
+                        <a:t>트래픽 부하 테스트</a:t>
                       </a:r>
                       <a:endParaRPr lang="en-US" altLang="ko-KR" sz="1400" dirty="0"/>
                     </a:p>
@@ -4091,10 +4099,10 @@
         </p:nvGrpSpPr>
         <p:grpSpPr>
           <a:xfrm>
-            <a:off x="1831508" y="3312886"/>
-            <a:ext cx="8110778" cy="3327211"/>
+            <a:off x="2257021" y="3429000"/>
+            <a:ext cx="6977514" cy="2905326"/>
             <a:chOff x="1744422" y="3429000"/>
-            <a:chExt cx="8110778" cy="3327211"/>
+            <a:chExt cx="8110778" cy="3377199"/>
           </a:xfrm>
         </p:grpSpPr>
         <p:grpSp>
@@ -4160,10 +4168,10 @@
               <a:p>
                 <a:pPr algn="ctr"/>
                 <a:r>
-                  <a:rPr lang="en-US" altLang="ko-KR" b="1" dirty="0"/>
+                  <a:rPr lang="en-US" altLang="ko-KR" sz="1400" b="1" dirty="0"/>
                   <a:t>Board System</a:t>
                 </a:r>
-                <a:endParaRPr lang="ko-KR" altLang="en-US" b="1" dirty="0"/>
+                <a:endParaRPr lang="ko-KR" altLang="en-US" sz="1400" b="1" dirty="0"/>
               </a:p>
             </p:txBody>
           </p:sp>
@@ -4210,10 +4218,10 @@
               <a:p>
                 <a:pPr algn="ctr"/>
                 <a:r>
-                  <a:rPr lang="en-US" altLang="ko-KR" b="1" dirty="0"/>
+                  <a:rPr lang="en-US" altLang="ko-KR" sz="1400" b="1" dirty="0"/>
                   <a:t>User System</a:t>
                 </a:r>
-                <a:endParaRPr lang="ko-KR" altLang="en-US" b="1" dirty="0"/>
+                <a:endParaRPr lang="ko-KR" altLang="en-US" sz="1400" b="1" dirty="0"/>
               </a:p>
             </p:txBody>
           </p:sp>
@@ -4260,10 +4268,10 @@
               <a:p>
                 <a:pPr algn="ctr"/>
                 <a:r>
-                  <a:rPr lang="en-US" altLang="ko-KR" b="1" dirty="0"/>
+                  <a:rPr lang="en-US" altLang="ko-KR" sz="1400" b="1" dirty="0"/>
                   <a:t>Log System</a:t>
                 </a:r>
-                <a:endParaRPr lang="ko-KR" altLang="en-US" b="1" dirty="0"/>
+                <a:endParaRPr lang="ko-KR" altLang="en-US" sz="1400" b="1" dirty="0"/>
               </a:p>
             </p:txBody>
           </p:sp>
@@ -4310,10 +4318,10 @@
               <a:p>
                 <a:pPr algn="ctr"/>
                 <a:r>
-                  <a:rPr lang="en-US" altLang="ko-KR" b="1" dirty="0"/>
+                  <a:rPr lang="en-US" altLang="ko-KR" sz="1400" b="1" dirty="0"/>
                   <a:t>LDAP System</a:t>
                 </a:r>
-                <a:endParaRPr lang="ko-KR" altLang="en-US" b="1" dirty="0"/>
+                <a:endParaRPr lang="ko-KR" altLang="en-US" sz="1400" b="1" dirty="0"/>
               </a:p>
             </p:txBody>
           </p:sp>
@@ -4461,8 +4469,8 @@
           </p:nvSpPr>
           <p:spPr>
             <a:xfrm>
-              <a:off x="4122056" y="6448434"/>
-              <a:ext cx="3985988" cy="307777"/>
+              <a:off x="3732482" y="6448434"/>
+              <a:ext cx="4765136" cy="357765"/>
             </a:xfrm>
             <a:prstGeom prst="rect">
               <a:avLst/>
@@ -4522,16 +4530,16 @@
           <a:p>
             <a:pPr algn="l"/>
             <a:r>
-              <a:rPr lang="ko-KR" altLang="en-US" sz="1800" b="1" i="0" dirty="0">
-                <a:solidFill>
-                  <a:srgbClr val="1F2328"/>
-                </a:solidFill>
-                <a:effectLst/>
-                <a:latin typeface="맑은 고딕" panose="020B0503020000020004" pitchFamily="50" charset="-127"/>
-              </a:rPr>
-              <a:t>테스트 개요 및 목적</a:t>
-            </a:r>
-            <a:endParaRPr lang="en-US" altLang="ko-KR" sz="1800" b="1" i="0" dirty="0">
+              <a:rPr lang="ko-KR" altLang="en-US" b="1" i="0" dirty="0">
+                <a:solidFill>
+                  <a:srgbClr val="1F2328"/>
+                </a:solidFill>
+                <a:effectLst/>
+                <a:latin typeface="맑은 고딕" panose="020B0503020000020004" pitchFamily="50" charset="-127"/>
+              </a:rPr>
+              <a:t>테스트 개요</a:t>
+            </a:r>
+            <a:endParaRPr lang="en-US" altLang="ko-KR" b="1" i="0" dirty="0">
               <a:solidFill>
                 <a:srgbClr val="1F2328"/>
               </a:solidFill>
@@ -6369,6 +6377,16 @@
           <a:lstStyle/>
           <a:p>
             <a:pPr algn="l"/>
+            <a:r>
+              <a:rPr lang="en-US" altLang="ko-KR" sz="1800" b="1" i="0" dirty="0">
+                <a:solidFill>
+                  <a:srgbClr val="1F2328"/>
+                </a:solidFill>
+                <a:effectLst/>
+                <a:latin typeface="맑은 고딕" panose="020B0503020000020004" pitchFamily="50" charset="-127"/>
+              </a:rPr>
+              <a:t>B. </a:t>
+            </a:r>
             <a:r>
               <a:rPr lang="ko-KR" altLang="en-US" sz="1800" b="1" i="0" dirty="0">
                 <a:solidFill>
@@ -11270,14 +11288,14 @@
           <p:nvPr>
             <p:extLst>
               <p:ext uri="{D42A27DB-BD31-4B8C-83A1-F6EECF244321}">
-                <p14:modId xmlns:p14="http://schemas.microsoft.com/office/powerpoint/2010/main" val="1455466063"/>
+                <p14:modId xmlns:p14="http://schemas.microsoft.com/office/powerpoint/2010/main" val="1414600466"/>
               </p:ext>
             </p:extLst>
           </p:nvPr>
         </p:nvGraphicFramePr>
         <p:xfrm>
           <a:off x="587547" y="1296851"/>
-          <a:ext cx="11016906" cy="5222240"/>
+          <a:ext cx="11016906" cy="5389880"/>
         </p:xfrm>
         <a:graphic>
           <a:graphicData uri="http://schemas.openxmlformats.org/drawingml/2006/table">
@@ -11399,7 +11417,7 @@
                   </a:ext>
                 </a:extLst>
               </a:tr>
-              <a:tr h="370840">
+              <a:tr h="421799">
                 <a:tc>
                   <a:txBody>
                     <a:bodyPr/>
@@ -11595,13 +11613,14 @@
                     <a:p>
                       <a:pPr latinLnBrk="1"/>
                       <a:r>
-                        <a:rPr lang="en-US" altLang="ko-KR" sz="1100" dirty="0"/>
+                        <a:rPr lang="en-US" altLang="ko-KR" sz="1100"/>
                         <a:t>URL</a:t>
                       </a:r>
                       <a:r>
-                        <a:rPr lang="ko-KR" altLang="en-US" sz="1100" dirty="0"/>
+                        <a:rPr lang="ko-KR" altLang="en-US" sz="1100"/>
                         <a:t> 호출</a:t>
                       </a:r>
+                      <a:endParaRPr lang="ko-KR" altLang="en-US" sz="1100" dirty="0"/>
                     </a:p>
                   </a:txBody>
                   <a:tcPr anchor="ctr"/>
@@ -11646,46 +11665,15 @@
                           <a:effectLst/>
                           <a:latin typeface="맑은 고딕" panose="020B0503020000020004" pitchFamily="50" charset="-127"/>
                         </a:rPr>
-                        <a:t>호출 </a:t>
-                      </a:r>
-                      <a:r>
-                        <a:rPr lang="en-US" altLang="ko-KR" sz="1100" b="0" i="0" dirty="0">
-                          <a:solidFill>
-                            <a:srgbClr val="1F2328"/>
-                          </a:solidFill>
-                          <a:effectLst/>
-                          <a:latin typeface="맑은 고딕" panose="020B0503020000020004" pitchFamily="50" charset="-127"/>
-                        </a:rPr>
-                        <a:t>(</a:t>
-                      </a:r>
-                      <a:r>
-                        <a:rPr lang="en-US" altLang="ko-KR" sz="1100" b="0" i="0" u="sng" dirty="0">
-                          <a:effectLst/>
-                          <a:latin typeface="맑은 고딕" panose="020B0503020000020004" pitchFamily="50" charset="-127"/>
-                          <a:hlinkClick r:id="rId3"/>
-                        </a:rPr>
-                        <a:t>http://localhost:10010/board</a:t>
-                      </a:r>
-                      <a:r>
-                        <a:rPr lang="en-US" altLang="ko-KR" sz="1100" b="0" i="0" dirty="0">
-                          <a:solidFill>
-                            <a:srgbClr val="1F2328"/>
-                          </a:solidFill>
-                          <a:effectLst/>
-                          <a:latin typeface="맑은 고딕" panose="020B0503020000020004" pitchFamily="50" charset="-127"/>
-                        </a:rPr>
-                        <a:t> </a:t>
-                      </a:r>
-                      <a:r>
-                        <a:rPr lang="en-US" altLang="ko-KR" sz="1100" b="0" i="0" u="sng" dirty="0">
-                          <a:solidFill>
-                            <a:srgbClr val="1F2328"/>
-                          </a:solidFill>
-                          <a:effectLst/>
-                          <a:latin typeface="맑은 고딕" panose="020B0503020000020004" pitchFamily="50" charset="-127"/>
-                        </a:rPr>
-                        <a:t>)</a:t>
-                      </a:r>
+                        <a:t>호출</a:t>
+                      </a:r>
+                      <a:endParaRPr lang="en-US" altLang="ko-KR" sz="1100" b="0" i="0" u="sng" dirty="0">
+                        <a:solidFill>
+                          <a:srgbClr val="1F2328"/>
+                        </a:solidFill>
+                        <a:effectLst/>
+                        <a:latin typeface="맑은 고딕" panose="020B0503020000020004" pitchFamily="50" charset="-127"/>
+                      </a:endParaRPr>
                     </a:p>
                   </a:txBody>
                   <a:tcPr anchor="ctr"/>
@@ -11787,6 +11775,35 @@
                     <a:lstStyle/>
                     <a:p>
                       <a:pPr latinLnBrk="1"/>
+                      <a:r>
+                        <a:rPr lang="en-US" altLang="ko-KR" sz="1100" dirty="0"/>
+                        <a:t>URL</a:t>
+                      </a:r>
+                      <a:br>
+                        <a:rPr lang="en-US" altLang="ko-KR" sz="1100" dirty="0"/>
+                      </a:br>
+                      <a:r>
+                        <a:rPr lang="en-US" altLang="ko-KR" sz="1100" dirty="0"/>
+                        <a:t>(</a:t>
+                      </a:r>
+                      <a:r>
+                        <a:rPr lang="en-US" altLang="ko-KR" sz="1100" b="0" i="0" u="sng" dirty="0">
+                          <a:effectLst/>
+                          <a:latin typeface="맑은 고딕" panose="020B0503020000020004" pitchFamily="50" charset="-127"/>
+                          <a:hlinkClick r:id="rId3"/>
+                        </a:rPr>
+                        <a:t>http://localhost:10010/board</a:t>
+                      </a:r>
+                      <a:r>
+                        <a:rPr lang="en-US" altLang="ko-KR" sz="1100" b="0" i="0" u="sng" dirty="0">
+                          <a:solidFill>
+                            <a:srgbClr val="1F2328"/>
+                          </a:solidFill>
+                          <a:effectLst/>
+                          <a:latin typeface="맑은 고딕" panose="020B0503020000020004" pitchFamily="50" charset="-127"/>
+                        </a:rPr>
+                        <a:t>)</a:t>
+                      </a:r>
                       <a:endParaRPr lang="ko-KR" altLang="en-US" sz="1100" dirty="0"/>
                     </a:p>
                   </a:txBody>
@@ -11848,7 +11865,7 @@
                         <a:t>3. Jaeger </a:t>
                       </a:r>
                       <a:r>
-                        <a:rPr lang="ko-KR" altLang="sv-SE" sz="1100" b="0" i="0" kern="1200" dirty="0">
+                        <a:rPr lang="ko-KR" altLang="en-US" sz="1100" b="0" i="0" kern="1200" dirty="0">
                           <a:solidFill>
                             <a:schemeClr val="dk1"/>
                           </a:solidFill>
@@ -11857,7 +11874,7 @@
                           <a:ea typeface="+mn-ea"/>
                           <a:cs typeface="+mn-cs"/>
                         </a:rPr>
-                        <a:t>접속</a:t>
+                        <a:t>대시보드 확인</a:t>
                       </a:r>
                       <a:endParaRPr lang="en-US" altLang="ko-KR" sz="1100" b="0" i="0" kern="1200" dirty="0">
                         <a:solidFill>
@@ -11867,81 +11884,6 @@
                         <a:latin typeface="+mn-lt"/>
                         <a:ea typeface="+mn-ea"/>
                         <a:cs typeface="+mn-cs"/>
-                      </a:endParaRPr>
-                    </a:p>
-                    <a:p>
-                      <a:pPr marL="0" marR="0" lvl="0" indent="0" algn="l" defTabSz="914400" rtl="0" eaLnBrk="1" fontAlgn="auto" latinLnBrk="1" hangingPunct="1">
-                        <a:lnSpc>
-                          <a:spcPct val="100000"/>
-                        </a:lnSpc>
-                        <a:spcBef>
-                          <a:spcPts val="0"/>
-                        </a:spcBef>
-                        <a:spcAft>
-                          <a:spcPts val="0"/>
-                        </a:spcAft>
-                        <a:buClrTx/>
-                        <a:buSzTx/>
-                        <a:buFontTx/>
-                        <a:buNone/>
-                        <a:tabLst/>
-                        <a:defRPr/>
-                      </a:pPr>
-                      <a:r>
-                        <a:rPr lang="ko-KR" altLang="sv-SE" sz="1100" b="0" i="0" kern="1200" dirty="0">
-                          <a:solidFill>
-                            <a:schemeClr val="dk1"/>
-                          </a:solidFill>
-                          <a:effectLst/>
-                          <a:latin typeface="+mn-lt"/>
-                          <a:ea typeface="+mn-ea"/>
-                          <a:cs typeface="+mn-cs"/>
-                        </a:rPr>
-                        <a:t> </a:t>
-                      </a:r>
-                      <a:r>
-                        <a:rPr lang="en-US" altLang="ko-KR" sz="1100" b="0" i="0" kern="1200" dirty="0">
-                          <a:solidFill>
-                            <a:schemeClr val="dk1"/>
-                          </a:solidFill>
-                          <a:effectLst/>
-                          <a:latin typeface="+mn-lt"/>
-                          <a:ea typeface="+mn-ea"/>
-                          <a:cs typeface="+mn-cs"/>
-                        </a:rPr>
-                        <a:t>(</a:t>
-                      </a:r>
-                      <a:r>
-                        <a:rPr lang="sv-SE" altLang="ko-KR" sz="1100" b="0" i="0" u="none" strike="noStrike" kern="1200" dirty="0">
-                          <a:solidFill>
-                            <a:schemeClr val="dk1"/>
-                          </a:solidFill>
-                          <a:effectLst/>
-                          <a:latin typeface="+mn-lt"/>
-                          <a:ea typeface="+mn-ea"/>
-                          <a:cs typeface="+mn-cs"/>
-                          <a:hlinkClick r:id="rId4"/>
-                        </a:rPr>
-                        <a:t>http://localhost:16686</a:t>
-                      </a:r>
-                      <a:r>
-                        <a:rPr lang="sv-SE" altLang="ko-KR" sz="1100" b="0" i="0" u="none" strike="noStrike" kern="1200" dirty="0">
-                          <a:solidFill>
-                            <a:schemeClr val="dk1"/>
-                          </a:solidFill>
-                          <a:effectLst/>
-                          <a:latin typeface="+mn-lt"/>
-                          <a:ea typeface="+mn-ea"/>
-                          <a:cs typeface="+mn-cs"/>
-                        </a:rPr>
-                        <a:t>)</a:t>
-                      </a:r>
-                      <a:endParaRPr lang="en-US" altLang="ko-KR" sz="1100" b="0" i="0" dirty="0">
-                        <a:solidFill>
-                          <a:srgbClr val="1F2328"/>
-                        </a:solidFill>
-                        <a:effectLst/>
-                        <a:latin typeface="맑은 고딕" panose="020B0503020000020004" pitchFamily="50" charset="-127"/>
                       </a:endParaRPr>
                     </a:p>
                   </a:txBody>
@@ -12549,67 +12491,7 @@
                           <a:ea typeface="+mn-ea"/>
                           <a:cs typeface="+mn-cs"/>
                         </a:rPr>
-                        <a:t>접속</a:t>
-                      </a:r>
-                      <a:br>
-                        <a:rPr lang="en-US" altLang="ko-KR" sz="1100" b="0" i="0" kern="1200" dirty="0">
-                          <a:solidFill>
-                            <a:schemeClr val="dk1"/>
-                          </a:solidFill>
-                          <a:effectLst/>
-                          <a:latin typeface="+mn-lt"/>
-                          <a:ea typeface="+mn-ea"/>
-                          <a:cs typeface="+mn-cs"/>
-                        </a:rPr>
-                      </a:br>
-                      <a:r>
-                        <a:rPr lang="ko-KR" altLang="sv-SE" sz="1100" b="0" i="0" kern="1200" dirty="0">
-                          <a:solidFill>
-                            <a:schemeClr val="dk1"/>
-                          </a:solidFill>
-                          <a:effectLst/>
-                          <a:latin typeface="+mn-lt"/>
-                          <a:ea typeface="+mn-ea"/>
-                          <a:cs typeface="+mn-cs"/>
-                        </a:rPr>
-                        <a:t> </a:t>
-                      </a:r>
-                      <a:r>
-                        <a:rPr lang="en-US" altLang="ko-KR" sz="1100" b="0" i="0" kern="1200" dirty="0">
-                          <a:solidFill>
-                            <a:schemeClr val="dk1"/>
-                          </a:solidFill>
-                          <a:effectLst/>
-                          <a:latin typeface="+mn-lt"/>
-                          <a:ea typeface="+mn-ea"/>
-                          <a:cs typeface="+mn-cs"/>
-                        </a:rPr>
-                        <a:t>(</a:t>
-                      </a:r>
-                      <a:r>
-                        <a:rPr lang="sv-SE" altLang="ko-KR" sz="1100" b="0" i="0" u="none" strike="noStrike" kern="1200" dirty="0">
-                          <a:solidFill>
-                            <a:schemeClr val="dk1"/>
-                          </a:solidFill>
-                          <a:effectLst/>
-                          <a:latin typeface="+mn-lt"/>
-                          <a:ea typeface="+mn-ea"/>
-                          <a:cs typeface="+mn-cs"/>
-                          <a:hlinkClick r:id="rId5"/>
-                        </a:rPr>
-                        <a:t>http://localhost:3000</a:t>
-                      </a:r>
-                      <a:r>
-                        <a:rPr lang="sv-SE" altLang="ko-KR" sz="1100" b="0" i="0" u="none" strike="noStrike" kern="1200" dirty="0">
-                          <a:solidFill>
-                            <a:schemeClr val="dk1"/>
-                          </a:solidFill>
-                          <a:effectLst/>
-                          <a:latin typeface="+mn-lt"/>
-                          <a:ea typeface="+mn-ea"/>
-                          <a:cs typeface="+mn-cs"/>
-                        </a:rPr>
-                        <a:t>)</a:t>
+                        <a:t>대시보드 확인</a:t>
                       </a:r>
                       <a:endParaRPr lang="ko-KR" altLang="en-US" sz="1100" dirty="0"/>
                     </a:p>
@@ -13229,6 +13111,15 @@
           <a:lstStyle/>
           <a:p>
             <a:pPr algn="l"/>
+            <a:r>
+              <a:rPr lang="en-US" altLang="ko-KR" b="1" dirty="0">
+                <a:solidFill>
+                  <a:srgbClr val="1F2328"/>
+                </a:solidFill>
+                <a:latin typeface="맑은 고딕" panose="020B0503020000020004" pitchFamily="50" charset="-127"/>
+              </a:rPr>
+              <a:t>A. </a:t>
+            </a:r>
             <a:r>
               <a:rPr lang="ko-KR" altLang="en-US" b="1" dirty="0">
                 <a:solidFill>
@@ -14114,8 +14005,8 @@
         </p:nvSpPr>
         <p:spPr>
           <a:xfrm>
-            <a:off x="85725" y="104398"/>
-            <a:ext cx="6096000" cy="369332"/>
+            <a:off x="85724" y="104398"/>
+            <a:ext cx="8171035" cy="369332"/>
           </a:xfrm>
           <a:prstGeom prst="rect">
             <a:avLst/>
@@ -14128,7 +14019,6 @@
           </a:bodyPr>
           <a:lstStyle/>
           <a:p>
-            <a:pPr algn="l"/>
             <a:r>
               <a:rPr lang="ko-KR" altLang="en-US" b="1" dirty="0">
                 <a:solidFill>
@@ -14176,8 +14066,65 @@
                 <a:effectLst/>
                 <a:latin typeface="맑은 고딕" panose="020B0503020000020004" pitchFamily="50" charset="-127"/>
               </a:rPr>
-              <a:t>)</a:t>
-            </a:r>
+              <a:t>) - </a:t>
+            </a:r>
+            <a:r>
+              <a:rPr lang="en-US" altLang="ko-KR" sz="1800" b="1" i="0" u="none" dirty="0">
+                <a:solidFill>
+                  <a:srgbClr val="1F2328"/>
+                </a:solidFill>
+                <a:effectLst/>
+                <a:latin typeface="맑은 고딕" panose="020B0503020000020004" pitchFamily="50" charset="-127"/>
+              </a:rPr>
+              <a:t>1. </a:t>
+            </a:r>
+            <a:r>
+              <a:rPr lang="ko-KR" altLang="en-US" sz="1800" b="1" i="0" u="none" dirty="0">
+                <a:solidFill>
+                  <a:srgbClr val="1F2328"/>
+                </a:solidFill>
+                <a:effectLst/>
+                <a:latin typeface="맑은 고딕" panose="020B0503020000020004" pitchFamily="50" charset="-127"/>
+              </a:rPr>
+              <a:t>배치 파일 실행 </a:t>
+            </a:r>
+            <a:r>
+              <a:rPr lang="en-US" altLang="ko-KR" sz="1800" b="1" i="0" u="none" dirty="0">
+                <a:solidFill>
+                  <a:srgbClr val="1F2328"/>
+                </a:solidFill>
+                <a:effectLst/>
+                <a:latin typeface="맑은 고딕" panose="020B0503020000020004" pitchFamily="50" charset="-127"/>
+              </a:rPr>
+              <a:t>&amp; </a:t>
+            </a:r>
+            <a:r>
+              <a:rPr lang="en-US" altLang="ko-KR" sz="1800" b="1" i="0" dirty="0">
+                <a:solidFill>
+                  <a:srgbClr val="1F2328"/>
+                </a:solidFill>
+                <a:effectLst/>
+                <a:latin typeface="맑은 고딕" panose="020B0503020000020004" pitchFamily="50" charset="-127"/>
+              </a:rPr>
+              <a:t>2. URL </a:t>
+            </a:r>
+            <a:r>
+              <a:rPr lang="ko-KR" altLang="en-US" sz="1800" b="1" i="0" dirty="0">
+                <a:solidFill>
+                  <a:srgbClr val="1F2328"/>
+                </a:solidFill>
+                <a:effectLst/>
+                <a:latin typeface="맑은 고딕" panose="020B0503020000020004" pitchFamily="50" charset="-127"/>
+              </a:rPr>
+              <a:t>호출 </a:t>
+            </a:r>
+            <a:endParaRPr lang="en-US" altLang="ko-KR" sz="1800" b="1" i="0" u="none" dirty="0">
+              <a:solidFill>
+                <a:srgbClr val="1F2328"/>
+              </a:solidFill>
+              <a:effectLst/>
+              <a:latin typeface="맑은 고딕" panose="020B0503020000020004" pitchFamily="50" charset="-127"/>
+            </a:endParaRPr>
           </a:p>
         </p:txBody>
       </p:sp>
@@ -14593,7 +14540,6 @@
           </a:bodyPr>
           <a:lstStyle/>
           <a:p>
-            <a:pPr algn="l"/>
             <a:r>
               <a:rPr lang="ko-KR" altLang="en-US" b="1" dirty="0">
                 <a:solidFill>
@@ -14641,8 +14587,41 @@
                 <a:effectLst/>
                 <a:latin typeface="맑은 고딕" panose="020B0503020000020004" pitchFamily="50" charset="-127"/>
               </a:rPr>
-              <a:t>)</a:t>
-            </a:r>
+              <a:t>) - </a:t>
+            </a:r>
+            <a:r>
+              <a:rPr lang="sv-SE" altLang="ko-KR" sz="1800" b="1" i="0" kern="1200" dirty="0">
+                <a:solidFill>
+                  <a:schemeClr val="dk1"/>
+                </a:solidFill>
+                <a:effectLst/>
+                <a:latin typeface="+mn-lt"/>
+                <a:ea typeface="+mn-ea"/>
+                <a:cs typeface="+mn-cs"/>
+              </a:rPr>
+              <a:t>3. Jaeger </a:t>
+            </a:r>
+            <a:r>
+              <a:rPr lang="ko-KR" altLang="en-US" sz="1800" b="1" i="0" kern="1200" dirty="0">
+                <a:solidFill>
+                  <a:schemeClr val="dk1"/>
+                </a:solidFill>
+                <a:effectLst/>
+                <a:latin typeface="+mn-lt"/>
+                <a:ea typeface="+mn-ea"/>
+                <a:cs typeface="+mn-cs"/>
+              </a:rPr>
+              <a:t>대시보드 확인</a:t>
+            </a:r>
+            <a:endParaRPr lang="en-US" altLang="ko-KR" sz="1800" b="1" i="0" kern="1200" dirty="0">
+              <a:solidFill>
+                <a:schemeClr val="dk1"/>
+              </a:solidFill>
+              <a:effectLst/>
+              <a:latin typeface="+mn-lt"/>
+              <a:ea typeface="+mn-ea"/>
+              <a:cs typeface="+mn-cs"/>
+            </a:endParaRPr>
           </a:p>
         </p:txBody>
       </p:sp>
@@ -14995,7 +14974,6 @@
           </a:bodyPr>
           <a:lstStyle/>
           <a:p>
-            <a:pPr algn="l"/>
             <a:r>
               <a:rPr lang="ko-KR" altLang="en-US" b="1" dirty="0">
                 <a:solidFill>
@@ -15043,8 +15021,41 @@
                 <a:effectLst/>
                 <a:latin typeface="맑은 고딕" panose="020B0503020000020004" pitchFamily="50" charset="-127"/>
               </a:rPr>
-              <a:t>)</a:t>
-            </a:r>
+              <a:t>) - </a:t>
+            </a:r>
+            <a:r>
+              <a:rPr lang="sv-SE" altLang="ko-KR" sz="1800" b="1" i="0" kern="1200" dirty="0">
+                <a:solidFill>
+                  <a:schemeClr val="dk1"/>
+                </a:solidFill>
+                <a:effectLst/>
+                <a:latin typeface="+mn-lt"/>
+                <a:ea typeface="+mn-ea"/>
+                <a:cs typeface="+mn-cs"/>
+              </a:rPr>
+              <a:t>3. Jaeger </a:t>
+            </a:r>
+            <a:r>
+              <a:rPr lang="ko-KR" altLang="en-US" sz="1800" b="1" i="0" kern="1200" dirty="0">
+                <a:solidFill>
+                  <a:schemeClr val="dk1"/>
+                </a:solidFill>
+                <a:effectLst/>
+                <a:latin typeface="+mn-lt"/>
+                <a:ea typeface="+mn-ea"/>
+                <a:cs typeface="+mn-cs"/>
+              </a:rPr>
+              <a:t>대시보드 확인</a:t>
+            </a:r>
+            <a:endParaRPr lang="en-US" altLang="ko-KR" sz="1800" b="1" i="0" kern="1200" dirty="0">
+              <a:solidFill>
+                <a:schemeClr val="dk1"/>
+              </a:solidFill>
+              <a:effectLst/>
+              <a:latin typeface="+mn-lt"/>
+              <a:ea typeface="+mn-ea"/>
+              <a:cs typeface="+mn-cs"/>
+            </a:endParaRPr>
           </a:p>
         </p:txBody>
       </p:sp>
@@ -15733,8 +15744,63 @@
                 <a:effectLst/>
                 <a:latin typeface="맑은 고딕" panose="020B0503020000020004" pitchFamily="50" charset="-127"/>
               </a:rPr>
-              <a:t>)</a:t>
-            </a:r>
+              <a:t>) - </a:t>
+            </a:r>
+            <a:r>
+              <a:rPr lang="en-US" altLang="ko-KR" sz="1800" b="1" i="0" kern="1200" dirty="0">
+                <a:solidFill>
+                  <a:schemeClr val="dk1"/>
+                </a:solidFill>
+                <a:effectLst/>
+                <a:latin typeface="+mn-lt"/>
+                <a:ea typeface="+mn-ea"/>
+                <a:cs typeface="+mn-cs"/>
+              </a:rPr>
+              <a:t>4. </a:t>
+            </a:r>
+            <a:r>
+              <a:rPr lang="en-US" altLang="ko-KR" sz="1800" b="1" i="0" kern="1200" dirty="0" err="1">
+                <a:solidFill>
+                  <a:schemeClr val="dk1"/>
+                </a:solidFill>
+                <a:effectLst/>
+                <a:latin typeface="+mn-lt"/>
+                <a:ea typeface="+mn-ea"/>
+                <a:cs typeface="+mn-cs"/>
+              </a:rPr>
+              <a:t>grafana</a:t>
+            </a:r>
+            <a:r>
+              <a:rPr lang="en-US" altLang="ko-KR" sz="1800" b="1" i="0" kern="1200" dirty="0">
+                <a:solidFill>
+                  <a:schemeClr val="dk1"/>
+                </a:solidFill>
+                <a:effectLst/>
+                <a:latin typeface="+mn-lt"/>
+                <a:ea typeface="+mn-ea"/>
+                <a:cs typeface="+mn-cs"/>
+              </a:rPr>
+              <a:t> </a:t>
+            </a:r>
+            <a:r>
+              <a:rPr lang="ko-KR" altLang="en-US" sz="1800" b="1" i="0" kern="1200" dirty="0">
+                <a:solidFill>
+                  <a:schemeClr val="dk1"/>
+                </a:solidFill>
+                <a:effectLst/>
+                <a:latin typeface="+mn-lt"/>
+                <a:ea typeface="+mn-ea"/>
+                <a:cs typeface="+mn-cs"/>
+              </a:rPr>
+              <a:t>대시보드 확인</a:t>
+            </a:r>
+            <a:endParaRPr lang="en-US" altLang="ko-KR" sz="1800" b="1" i="0" dirty="0">
+              <a:solidFill>
+                <a:srgbClr val="1F2328"/>
+              </a:solidFill>
+              <a:effectLst/>
+              <a:latin typeface="맑은 고딕" panose="020B0503020000020004" pitchFamily="50" charset="-127"/>
+            </a:endParaRPr>
           </a:p>
         </p:txBody>
       </p:sp>
@@ -15896,8 +15962,63 @@
                 <a:effectLst/>
                 <a:latin typeface="맑은 고딕" panose="020B0503020000020004" pitchFamily="50" charset="-127"/>
               </a:rPr>
-              <a:t>)</a:t>
-            </a:r>
+              <a:t>) - </a:t>
+            </a:r>
+            <a:r>
+              <a:rPr lang="en-US" altLang="ko-KR" sz="1800" b="1" i="0" kern="1200" dirty="0">
+                <a:solidFill>
+                  <a:schemeClr val="dk1"/>
+                </a:solidFill>
+                <a:effectLst/>
+                <a:latin typeface="+mn-lt"/>
+                <a:ea typeface="+mn-ea"/>
+                <a:cs typeface="+mn-cs"/>
+              </a:rPr>
+              <a:t>4. </a:t>
+            </a:r>
+            <a:r>
+              <a:rPr lang="en-US" altLang="ko-KR" sz="1800" b="1" i="0" kern="1200" dirty="0" err="1">
+                <a:solidFill>
+                  <a:schemeClr val="dk1"/>
+                </a:solidFill>
+                <a:effectLst/>
+                <a:latin typeface="+mn-lt"/>
+                <a:ea typeface="+mn-ea"/>
+                <a:cs typeface="+mn-cs"/>
+              </a:rPr>
+              <a:t>grafana</a:t>
+            </a:r>
+            <a:r>
+              <a:rPr lang="en-US" altLang="ko-KR" sz="1800" b="1" i="0" kern="1200" dirty="0">
+                <a:solidFill>
+                  <a:schemeClr val="dk1"/>
+                </a:solidFill>
+                <a:effectLst/>
+                <a:latin typeface="+mn-lt"/>
+                <a:ea typeface="+mn-ea"/>
+                <a:cs typeface="+mn-cs"/>
+              </a:rPr>
+              <a:t> </a:t>
+            </a:r>
+            <a:r>
+              <a:rPr lang="ko-KR" altLang="en-US" sz="1800" b="1" i="0" kern="1200" dirty="0">
+                <a:solidFill>
+                  <a:schemeClr val="dk1"/>
+                </a:solidFill>
+                <a:effectLst/>
+                <a:latin typeface="+mn-lt"/>
+                <a:ea typeface="+mn-ea"/>
+                <a:cs typeface="+mn-cs"/>
+              </a:rPr>
+              <a:t>대시보드 확인</a:t>
+            </a:r>
+            <a:endParaRPr lang="en-US" altLang="ko-KR" sz="1800" b="1" i="0" dirty="0">
+              <a:solidFill>
+                <a:srgbClr val="1F2328"/>
+              </a:solidFill>
+              <a:effectLst/>
+              <a:latin typeface="맑은 고딕" panose="020B0503020000020004" pitchFamily="50" charset="-127"/>
+            </a:endParaRPr>
           </a:p>
         </p:txBody>
       </p:sp>
@@ -16181,8 +16302,63 @@
                 <a:effectLst/>
                 <a:latin typeface="맑은 고딕" panose="020B0503020000020004" pitchFamily="50" charset="-127"/>
               </a:rPr>
-              <a:t>)</a:t>
-            </a:r>
+              <a:t>) - </a:t>
+            </a:r>
+            <a:r>
+              <a:rPr lang="en-US" altLang="ko-KR" sz="1800" b="1" i="0" kern="1200" dirty="0">
+                <a:solidFill>
+                  <a:schemeClr val="dk1"/>
+                </a:solidFill>
+                <a:effectLst/>
+                <a:latin typeface="+mn-lt"/>
+                <a:ea typeface="+mn-ea"/>
+                <a:cs typeface="+mn-cs"/>
+              </a:rPr>
+              <a:t>4. </a:t>
+            </a:r>
+            <a:r>
+              <a:rPr lang="en-US" altLang="ko-KR" sz="1800" b="1" i="0" kern="1200" dirty="0" err="1">
+                <a:solidFill>
+                  <a:schemeClr val="dk1"/>
+                </a:solidFill>
+                <a:effectLst/>
+                <a:latin typeface="+mn-lt"/>
+                <a:ea typeface="+mn-ea"/>
+                <a:cs typeface="+mn-cs"/>
+              </a:rPr>
+              <a:t>grafana</a:t>
+            </a:r>
+            <a:r>
+              <a:rPr lang="en-US" altLang="ko-KR" sz="1800" b="1" i="0" kern="1200" dirty="0">
+                <a:solidFill>
+                  <a:schemeClr val="dk1"/>
+                </a:solidFill>
+                <a:effectLst/>
+                <a:latin typeface="+mn-lt"/>
+                <a:ea typeface="+mn-ea"/>
+                <a:cs typeface="+mn-cs"/>
+              </a:rPr>
+              <a:t> </a:t>
+            </a:r>
+            <a:r>
+              <a:rPr lang="ko-KR" altLang="en-US" sz="1800" b="1" i="0" kern="1200" dirty="0">
+                <a:solidFill>
+                  <a:schemeClr val="dk1"/>
+                </a:solidFill>
+                <a:effectLst/>
+                <a:latin typeface="+mn-lt"/>
+                <a:ea typeface="+mn-ea"/>
+                <a:cs typeface="+mn-cs"/>
+              </a:rPr>
+              <a:t>대시보드 확인</a:t>
+            </a:r>
+            <a:endParaRPr lang="en-US" altLang="ko-KR" sz="1800" b="1" i="0" dirty="0">
+              <a:solidFill>
+                <a:srgbClr val="1F2328"/>
+              </a:solidFill>
+              <a:effectLst/>
+              <a:latin typeface="맑은 고딕" panose="020B0503020000020004" pitchFamily="50" charset="-127"/>
+            </a:endParaRPr>
           </a:p>
         </p:txBody>
       </p:sp>
@@ -16429,7 +16605,7 @@
           <p:nvPr>
             <p:extLst>
               <p:ext uri="{D42A27DB-BD31-4B8C-83A1-F6EECF244321}">
-                <p14:modId xmlns:p14="http://schemas.microsoft.com/office/powerpoint/2010/main" val="3594905062"/>
+                <p14:modId xmlns:p14="http://schemas.microsoft.com/office/powerpoint/2010/main" val="2548086066"/>
               </p:ext>
             </p:extLst>
           </p:nvPr>
@@ -16763,44 +16939,12 @@
                         <a:defRPr/>
                       </a:pPr>
                       <a:r>
-                        <a:rPr lang="ko-KR" altLang="en-US" sz="1100" dirty="0"/>
-                        <a:t>사전작업</a:t>
-                      </a:r>
-                      <a:r>
-                        <a:rPr lang="en-US" altLang="ko-KR" sz="1100" dirty="0"/>
-                        <a:t>1</a:t>
-                      </a:r>
-                      <a:r>
-                        <a:rPr lang="ko-KR" altLang="en-US" sz="1100" dirty="0"/>
-                        <a:t> </a:t>
-                      </a:r>
-                      <a:endParaRPr lang="en-US" altLang="ko-KR" sz="1100" dirty="0"/>
-                    </a:p>
-                    <a:p>
-                      <a:pPr marL="0" marR="0" lvl="0" indent="0" algn="l" defTabSz="914400" rtl="0" eaLnBrk="1" fontAlgn="auto" latinLnBrk="1" hangingPunct="1">
-                        <a:lnSpc>
-                          <a:spcPct val="100000"/>
-                        </a:lnSpc>
-                        <a:spcBef>
-                          <a:spcPts val="0"/>
-                        </a:spcBef>
-                        <a:spcAft>
-                          <a:spcPts val="0"/>
-                        </a:spcAft>
-                        <a:buClrTx/>
-                        <a:buSzTx/>
-                        <a:buFontTx/>
-                        <a:buNone/>
-                        <a:tabLst/>
-                        <a:defRPr/>
-                      </a:pPr>
-                      <a:r>
                         <a:rPr lang="ko-KR" altLang="en-US" sz="1100" dirty="0" err="1"/>
                         <a:t>그라파나</a:t>
                       </a:r>
                       <a:r>
                         <a:rPr lang="ko-KR" altLang="en-US" sz="1100" dirty="0"/>
-                        <a:t> 알람 수신 기능 설정</a:t>
+                        <a:t> 알람 기능 설정</a:t>
                       </a:r>
                     </a:p>
                   </a:txBody>
@@ -17876,33 +18020,6 @@
                         <a:defRPr/>
                       </a:pPr>
                       <a:r>
-                        <a:rPr lang="ko-KR" altLang="en-US" sz="1100" dirty="0"/>
-                        <a:t>사전작업</a:t>
-                      </a:r>
-                      <a:r>
-                        <a:rPr lang="en-US" altLang="ko-KR" sz="1100" dirty="0"/>
-                        <a:t>2</a:t>
-                      </a:r>
-                    </a:p>
-                    <a:p>
-                      <a:pPr marL="0" marR="0" lvl="0" indent="0" algn="l" defTabSz="914400" rtl="0" eaLnBrk="1" fontAlgn="auto" latinLnBrk="1" hangingPunct="1">
-                        <a:lnSpc>
-                          <a:spcPct val="100000"/>
-                        </a:lnSpc>
-                        <a:spcBef>
-                          <a:spcPts val="0"/>
-                        </a:spcBef>
-                        <a:spcAft>
-                          <a:spcPts val="0"/>
-                        </a:spcAft>
-                        <a:buClrTx/>
-                        <a:buSzTx/>
-                        <a:buFontTx/>
-                        <a:buNone/>
-                        <a:tabLst/>
-                        <a:defRPr/>
-                      </a:pPr>
-                      <a:r>
                         <a:rPr lang="ko-KR" altLang="en-US" sz="1100" dirty="0" err="1"/>
                         <a:t>그라파나</a:t>
                       </a:r>
@@ -18107,6 +18224,16 @@
           <a:lstStyle/>
           <a:p>
             <a:pPr algn="l"/>
+            <a:r>
+              <a:rPr lang="en-US" altLang="ko-KR" sz="1800" b="1" i="0" dirty="0">
+                <a:solidFill>
+                  <a:srgbClr val="1F2328"/>
+                </a:solidFill>
+                <a:effectLst/>
+                <a:latin typeface="맑은 고딕" panose="020B0503020000020004" pitchFamily="50" charset="-127"/>
+              </a:rPr>
+              <a:t>B. </a:t>
+            </a:r>
             <a:r>
               <a:rPr lang="ko-KR" altLang="en-US" sz="1800" b="1" i="0" dirty="0">
                 <a:solidFill>

</xml_diff>